<commit_message>
Add bayes theorem to naive bayes
</commit_message>
<xml_diff>
--- a/presentations/NaiveBayes.pptx
+++ b/presentations/NaiveBayes.pptx
@@ -6,11 +6,12 @@
   </p:sldMasterIdLst>
   <p:sldIdLst>
     <p:sldId id="256" r:id="rId2"/>
-    <p:sldId id="257" r:id="rId3"/>
-    <p:sldId id="263" r:id="rId4"/>
-    <p:sldId id="264" r:id="rId5"/>
-    <p:sldId id="266" r:id="rId6"/>
-    <p:sldId id="265" r:id="rId7"/>
+    <p:sldId id="267" r:id="rId3"/>
+    <p:sldId id="257" r:id="rId4"/>
+    <p:sldId id="263" r:id="rId5"/>
+    <p:sldId id="264" r:id="rId6"/>
+    <p:sldId id="266" r:id="rId7"/>
+    <p:sldId id="265" r:id="rId8"/>
   </p:sldIdLst>
   <p:sldSz cx="9144000" cy="6858000" type="screen4x3"/>
   <p:notesSz cx="6858000" cy="9144000"/>
@@ -300,7 +301,7 @@
           <a:p>
             <a:fld id="{F2853615-BFDE-46DE-814C-47EC6EF6D371}" type="datetimeFigureOut">
               <a:rPr lang="el-GR" smtClean="0"/>
-              <a:t>18/9/2018</a:t>
+              <a:t>15/2/2019</a:t>
             </a:fld>
             <a:endParaRPr lang="el-GR"/>
           </a:p>
@@ -500,7 +501,7 @@
           <a:p>
             <a:fld id="{F2853615-BFDE-46DE-814C-47EC6EF6D371}" type="datetimeFigureOut">
               <a:rPr lang="el-GR" smtClean="0"/>
-              <a:t>18/9/2018</a:t>
+              <a:t>15/2/2019</a:t>
             </a:fld>
             <a:endParaRPr lang="el-GR"/>
           </a:p>
@@ -675,7 +676,7 @@
           <a:p>
             <a:fld id="{F2853615-BFDE-46DE-814C-47EC6EF6D371}" type="datetimeFigureOut">
               <a:rPr lang="el-GR" smtClean="0"/>
-              <a:t>18/9/2018</a:t>
+              <a:t>15/2/2019</a:t>
             </a:fld>
             <a:endParaRPr lang="el-GR"/>
           </a:p>
@@ -840,7 +841,7 @@
           <a:p>
             <a:fld id="{F2853615-BFDE-46DE-814C-47EC6EF6D371}" type="datetimeFigureOut">
               <a:rPr lang="el-GR" smtClean="0"/>
-              <a:t>18/9/2018</a:t>
+              <a:t>15/2/2019</a:t>
             </a:fld>
             <a:endParaRPr lang="el-GR"/>
           </a:p>
@@ -979,7 +980,7 @@
           <a:p>
             <a:fld id="{F2853615-BFDE-46DE-814C-47EC6EF6D371}" type="datetimeFigureOut">
               <a:rPr lang="el-GR" smtClean="0"/>
-              <a:t>18/9/2018</a:t>
+              <a:t>15/2/2019</a:t>
             </a:fld>
             <a:endParaRPr lang="el-GR"/>
           </a:p>
@@ -1297,7 +1298,7 @@
           <a:p>
             <a:fld id="{F2853615-BFDE-46DE-814C-47EC6EF6D371}" type="datetimeFigureOut">
               <a:rPr lang="el-GR" smtClean="0"/>
-              <a:t>18/9/2018</a:t>
+              <a:t>15/2/2019</a:t>
             </a:fld>
             <a:endParaRPr lang="el-GR"/>
           </a:p>
@@ -1763,7 +1764,7 @@
           <a:p>
             <a:fld id="{F2853615-BFDE-46DE-814C-47EC6EF6D371}" type="datetimeFigureOut">
               <a:rPr lang="el-GR" smtClean="0"/>
-              <a:t>18/9/2018</a:t>
+              <a:t>15/2/2019</a:t>
             </a:fld>
             <a:endParaRPr lang="el-GR"/>
           </a:p>
@@ -1911,7 +1912,7 @@
           <a:p>
             <a:fld id="{F2853615-BFDE-46DE-814C-47EC6EF6D371}" type="datetimeFigureOut">
               <a:rPr lang="el-GR" smtClean="0"/>
-              <a:t>18/9/2018</a:t>
+              <a:t>15/2/2019</a:t>
             </a:fld>
             <a:endParaRPr lang="el-GR"/>
           </a:p>
@@ -2001,7 +2002,7 @@
           <a:p>
             <a:fld id="{F2853615-BFDE-46DE-814C-47EC6EF6D371}" type="datetimeFigureOut">
               <a:rPr lang="el-GR" smtClean="0"/>
-              <a:t>18/9/2018</a:t>
+              <a:t>15/2/2019</a:t>
             </a:fld>
             <a:endParaRPr lang="el-GR"/>
           </a:p>
@@ -2275,7 +2276,7 @@
           <a:p>
             <a:fld id="{F2853615-BFDE-46DE-814C-47EC6EF6D371}" type="datetimeFigureOut">
               <a:rPr lang="el-GR" smtClean="0"/>
-              <a:t>18/9/2018</a:t>
+              <a:t>15/2/2019</a:t>
             </a:fld>
             <a:endParaRPr lang="el-GR"/>
           </a:p>
@@ -2580,7 +2581,7 @@
           <a:p>
             <a:fld id="{F2853615-BFDE-46DE-814C-47EC6EF6D371}" type="datetimeFigureOut">
               <a:rPr lang="el-GR" smtClean="0"/>
-              <a:t>18/9/2018</a:t>
+              <a:t>15/2/2019</a:t>
             </a:fld>
             <a:endParaRPr lang="el-GR"/>
           </a:p>
@@ -2878,7 +2879,7 @@
           <a:p>
             <a:fld id="{F2853615-BFDE-46DE-814C-47EC6EF6D371}" type="datetimeFigureOut">
               <a:rPr lang="el-GR" smtClean="0"/>
-              <a:t>18/9/2018</a:t>
+              <a:t>15/2/2019</a:t>
             </a:fld>
             <a:endParaRPr lang="el-GR"/>
           </a:p>
@@ -3383,6 +3384,684 @@
 </file>
 
 <file path=ppt/slides/slide2.xml><?xml version="1.0" encoding="utf-8"?>
+<p:sld xmlns:a="http://schemas.openxmlformats.org/drawingml/2006/main" xmlns:r="http://schemas.openxmlformats.org/officeDocument/2006/relationships" xmlns:p="http://schemas.openxmlformats.org/presentationml/2006/main">
+  <p:cSld>
+    <p:spTree>
+      <p:nvGrpSpPr>
+        <p:cNvPr id="1" name=""/>
+        <p:cNvGrpSpPr/>
+        <p:nvPr/>
+      </p:nvGrpSpPr>
+      <p:grpSpPr>
+        <a:xfrm>
+          <a:off x="0" y="0"/>
+          <a:ext cx="0" cy="0"/>
+          <a:chOff x="0" y="0"/>
+          <a:chExt cx="0" cy="0"/>
+        </a:xfrm>
+      </p:grpSpPr>
+      <p:sp>
+        <p:nvSpPr>
+          <p:cNvPr id="2" name="Τίτλος 1"/>
+          <p:cNvSpPr>
+            <a:spLocks noGrp="1"/>
+          </p:cNvSpPr>
+          <p:nvPr>
+            <p:ph type="title"/>
+          </p:nvPr>
+        </p:nvSpPr>
+        <p:spPr/>
+        <p:txBody>
+          <a:bodyPr>
+            <a:normAutofit/>
+          </a:bodyPr>
+          <a:lstStyle/>
+          <a:p>
+            <a:r>
+              <a:rPr lang="en-US" dirty="0" smtClean="0"/>
+              <a:t>Bayes Theorem</a:t>
+            </a:r>
+            <a:endParaRPr lang="el-GR" dirty="0"/>
+          </a:p>
+        </p:txBody>
+      </p:sp>
+      <p:sp>
+        <p:nvSpPr>
+          <p:cNvPr id="3" name="Θέση περιεχομένου 2"/>
+          <p:cNvSpPr>
+            <a:spLocks noGrp="1"/>
+          </p:cNvSpPr>
+          <p:nvPr>
+            <p:ph idx="1"/>
+          </p:nvPr>
+        </p:nvSpPr>
+        <p:spPr>
+          <a:xfrm>
+            <a:off x="457200" y="1600200"/>
+            <a:ext cx="8147248" cy="3701008"/>
+          </a:xfrm>
+        </p:spPr>
+        <p:txBody>
+          <a:bodyPr>
+            <a:normAutofit fontScale="92500" lnSpcReduction="10000"/>
+          </a:bodyPr>
+          <a:lstStyle/>
+          <a:p>
+            <a:r>
+              <a:rPr lang="en-US" dirty="0" smtClean="0"/>
+              <a:t>Equation created by Thomas Bayes in 1763:</a:t>
+            </a:r>
+          </a:p>
+          <a:p>
+            <a:endParaRPr lang="en-US" dirty="0"/>
+          </a:p>
+          <a:p>
+            <a:endParaRPr lang="en-US" dirty="0" smtClean="0"/>
+          </a:p>
+          <a:p>
+            <a:endParaRPr lang="en-US" sz="2300" dirty="0" smtClean="0"/>
+          </a:p>
+          <a:p>
+            <a:endParaRPr lang="en-US" sz="2300" dirty="0"/>
+          </a:p>
+          <a:p>
+            <a:pPr marL="177800" indent="0">
+              <a:buNone/>
+            </a:pPr>
+            <a:r>
+              <a:rPr lang="en-US" dirty="0" smtClean="0"/>
+              <a:t>where    and</a:t>
+            </a:r>
+            <a:r>
+              <a:rPr lang="en-US" sz="2200" dirty="0" smtClean="0"/>
+              <a:t>     </a:t>
+            </a:r>
+            <a:r>
+              <a:rPr lang="en-US" dirty="0" smtClean="0"/>
+              <a:t>are </a:t>
+            </a:r>
+            <a:r>
+              <a:rPr lang="en-US" dirty="0"/>
+              <a:t>events </a:t>
+            </a:r>
+            <a:r>
+              <a:rPr lang="en-US" dirty="0" smtClean="0"/>
+              <a:t>and</a:t>
+            </a:r>
+          </a:p>
+          <a:p>
+            <a:pPr marL="177800" indent="0">
+              <a:buNone/>
+            </a:pPr>
+            <a:endParaRPr lang="en-US" dirty="0" smtClean="0"/>
+          </a:p>
+          <a:p>
+            <a:pPr marL="177800" indent="0">
+              <a:buNone/>
+            </a:pPr>
+            <a:r>
+              <a:rPr lang="en-US" dirty="0" smtClean="0"/>
+              <a:t>            : likelihood </a:t>
+            </a:r>
+            <a:r>
+              <a:rPr lang="en-US" dirty="0"/>
+              <a:t>of event A </a:t>
+            </a:r>
+            <a:r>
+              <a:rPr lang="en-US" dirty="0" smtClean="0"/>
+              <a:t>occurring </a:t>
+            </a:r>
+            <a:r>
+              <a:rPr lang="en-US" dirty="0"/>
+              <a:t>given that B </a:t>
+            </a:r>
+            <a:r>
+              <a:rPr lang="en-US" dirty="0" smtClean="0"/>
+              <a:t>is true</a:t>
+            </a:r>
+          </a:p>
+          <a:p>
+            <a:pPr marL="177800" indent="0">
+              <a:buNone/>
+            </a:pPr>
+            <a:endParaRPr lang="en-US" dirty="0" smtClean="0"/>
+          </a:p>
+          <a:p>
+            <a:pPr marL="177800" indent="0">
+              <a:buNone/>
+            </a:pPr>
+            <a:r>
+              <a:rPr lang="en-US" dirty="0" smtClean="0"/>
+              <a:t>            : likelihood </a:t>
+            </a:r>
+            <a:r>
+              <a:rPr lang="en-US" dirty="0"/>
+              <a:t>of event B </a:t>
+            </a:r>
+            <a:r>
+              <a:rPr lang="en-US" dirty="0" smtClean="0"/>
+              <a:t>occurring </a:t>
+            </a:r>
+            <a:r>
+              <a:rPr lang="en-US" dirty="0"/>
+              <a:t>given that </a:t>
+            </a:r>
+            <a:r>
+              <a:rPr lang="en-US" dirty="0" smtClean="0"/>
+              <a:t>A </a:t>
+            </a:r>
+            <a:r>
+              <a:rPr lang="en-US" dirty="0"/>
+              <a:t>is </a:t>
+            </a:r>
+            <a:r>
+              <a:rPr lang="en-US" dirty="0" smtClean="0"/>
+              <a:t>true</a:t>
+            </a:r>
+            <a:endParaRPr lang="en-US" dirty="0"/>
+          </a:p>
+        </p:txBody>
+      </p:sp>
+      <p:graphicFrame>
+        <p:nvGraphicFramePr>
+          <p:cNvPr id="6" name="Αντικείμενο 5"/>
+          <p:cNvGraphicFramePr>
+            <a:graphicFrameLocks noChangeAspect="1"/>
+          </p:cNvGraphicFramePr>
+          <p:nvPr>
+            <p:extLst>
+              <p:ext uri="{D42A27DB-BD31-4B8C-83A1-F6EECF244321}">
+                <p14:modId xmlns:p14="http://schemas.microsoft.com/office/powerpoint/2010/main" val="1333053642"/>
+              </p:ext>
+            </p:extLst>
+          </p:nvPr>
+        </p:nvGraphicFramePr>
+        <p:xfrm>
+          <a:off x="3185344" y="2239442"/>
+          <a:ext cx="2970832" cy="973534"/>
+        </p:xfrm>
+        <a:graphic>
+          <a:graphicData uri="http://schemas.openxmlformats.org/presentationml/2006/ole">
+            <mc:AlternateContent xmlns:mc="http://schemas.openxmlformats.org/markup-compatibility/2006">
+              <mc:Choice xmlns:v="urn:schemas-microsoft-com:vml" Requires="v">
+                <p:oleObj spid="_x0000_s4164" name="Equation" r:id="rId3" imgW="1460160" imgH="469800" progId="Equation.DSMT4">
+                  <p:embed/>
+                </p:oleObj>
+              </mc:Choice>
+              <mc:Fallback>
+                <p:oleObj name="Equation" r:id="rId3" imgW="1460160" imgH="469800" progId="Equation.DSMT4">
+                  <p:embed/>
+                  <p:pic>
+                    <p:nvPicPr>
+                      <p:cNvPr id="0" name="Αντικείμενο 4"/>
+                      <p:cNvPicPr>
+                        <a:picLocks noChangeAspect="1" noChangeArrowheads="1"/>
+                      </p:cNvPicPr>
+                      <p:nvPr/>
+                    </p:nvPicPr>
+                    <p:blipFill>
+                      <a:blip r:embed="rId4"/>
+                      <a:srcRect/>
+                      <a:stretch>
+                        <a:fillRect/>
+                      </a:stretch>
+                    </p:blipFill>
+                    <p:spPr bwMode="auto">
+                      <a:xfrm>
+                        <a:off x="3185344" y="2239442"/>
+                        <a:ext cx="2970832" cy="973534"/>
+                      </a:xfrm>
+                      <a:prstGeom prst="rect">
+                        <a:avLst/>
+                      </a:prstGeom>
+                      <a:noFill/>
+                      <a:ln>
+                        <a:noFill/>
+                      </a:ln>
+                    </p:spPr>
+                  </p:pic>
+                </p:oleObj>
+              </mc:Fallback>
+            </mc:AlternateContent>
+          </a:graphicData>
+        </a:graphic>
+      </p:graphicFrame>
+      <p:graphicFrame>
+        <p:nvGraphicFramePr>
+          <p:cNvPr id="7" name="Αντικείμενο 6"/>
+          <p:cNvGraphicFramePr>
+            <a:graphicFrameLocks noChangeAspect="1"/>
+          </p:cNvGraphicFramePr>
+          <p:nvPr>
+            <p:extLst>
+              <p:ext uri="{D42A27DB-BD31-4B8C-83A1-F6EECF244321}">
+                <p14:modId xmlns:p14="http://schemas.microsoft.com/office/powerpoint/2010/main" val="2574950485"/>
+              </p:ext>
+            </p:extLst>
+          </p:nvPr>
+        </p:nvGraphicFramePr>
+        <p:xfrm>
+          <a:off x="683568" y="4079354"/>
+          <a:ext cx="1033462" cy="527050"/>
+        </p:xfrm>
+        <a:graphic>
+          <a:graphicData uri="http://schemas.openxmlformats.org/presentationml/2006/ole">
+            <mc:AlternateContent xmlns:mc="http://schemas.openxmlformats.org/markup-compatibility/2006">
+              <mc:Choice xmlns:v="urn:schemas-microsoft-com:vml" Requires="v">
+                <p:oleObj spid="_x0000_s4165" name="Equation" r:id="rId5" imgW="507960" imgH="253800" progId="Equation.DSMT4">
+                  <p:embed/>
+                </p:oleObj>
+              </mc:Choice>
+              <mc:Fallback>
+                <p:oleObj name="Equation" r:id="rId5" imgW="507960" imgH="253800" progId="Equation.DSMT4">
+                  <p:embed/>
+                  <p:pic>
+                    <p:nvPicPr>
+                      <p:cNvPr id="0" name="Αντικείμενο 5"/>
+                      <p:cNvPicPr>
+                        <a:picLocks noChangeAspect="1" noChangeArrowheads="1"/>
+                      </p:cNvPicPr>
+                      <p:nvPr/>
+                    </p:nvPicPr>
+                    <p:blipFill>
+                      <a:blip r:embed="rId6"/>
+                      <a:srcRect/>
+                      <a:stretch>
+                        <a:fillRect/>
+                      </a:stretch>
+                    </p:blipFill>
+                    <p:spPr bwMode="auto">
+                      <a:xfrm>
+                        <a:off x="683568" y="4079354"/>
+                        <a:ext cx="1033462" cy="527050"/>
+                      </a:xfrm>
+                      <a:prstGeom prst="rect">
+                        <a:avLst/>
+                      </a:prstGeom>
+                      <a:noFill/>
+                      <a:ln>
+                        <a:noFill/>
+                      </a:ln>
+                      <a:extLst>
+                        <a:ext uri="{909E8E84-426E-40DD-AFC4-6F175D3DCCD1}">
+                          <a14:hiddenFill xmlns:a14="http://schemas.microsoft.com/office/drawing/2010/main">
+                            <a:solidFill>
+                              <a:srgbClr val="FFFFFF"/>
+                            </a:solidFill>
+                          </a14:hiddenFill>
+                        </a:ext>
+                        <a:ext uri="{91240B29-F687-4F45-9708-019B960494DF}">
+                          <a14:hiddenLine xmlns:a14="http://schemas.microsoft.com/office/drawing/2010/main" w="9525">
+                            <a:solidFill>
+                              <a:srgbClr val="000000"/>
+                            </a:solidFill>
+                            <a:miter lim="800000"/>
+                            <a:headEnd/>
+                            <a:tailEnd/>
+                          </a14:hiddenLine>
+                        </a:ext>
+                      </a:extLst>
+                    </p:spPr>
+                  </p:pic>
+                </p:oleObj>
+              </mc:Fallback>
+            </mc:AlternateContent>
+          </a:graphicData>
+        </a:graphic>
+      </p:graphicFrame>
+      <p:graphicFrame>
+        <p:nvGraphicFramePr>
+          <p:cNvPr id="8" name="Αντικείμενο 7"/>
+          <p:cNvGraphicFramePr>
+            <a:graphicFrameLocks noChangeAspect="1"/>
+          </p:cNvGraphicFramePr>
+          <p:nvPr>
+            <p:extLst>
+              <p:ext uri="{D42A27DB-BD31-4B8C-83A1-F6EECF244321}">
+                <p14:modId xmlns:p14="http://schemas.microsoft.com/office/powerpoint/2010/main" val="2319130266"/>
+              </p:ext>
+            </p:extLst>
+          </p:nvPr>
+        </p:nvGraphicFramePr>
+        <p:xfrm>
+          <a:off x="1487512" y="3426336"/>
+          <a:ext cx="282575" cy="315913"/>
+        </p:xfrm>
+        <a:graphic>
+          <a:graphicData uri="http://schemas.openxmlformats.org/presentationml/2006/ole">
+            <mc:AlternateContent xmlns:mc="http://schemas.openxmlformats.org/markup-compatibility/2006">
+              <mc:Choice xmlns:v="urn:schemas-microsoft-com:vml" Requires="v">
+                <p:oleObj spid="_x0000_s4166" name="Equation" r:id="rId7" imgW="139680" imgH="152280" progId="Equation.DSMT4">
+                  <p:embed/>
+                </p:oleObj>
+              </mc:Choice>
+              <mc:Fallback>
+                <p:oleObj name="Equation" r:id="rId7" imgW="139680" imgH="152280" progId="Equation.DSMT4">
+                  <p:embed/>
+                  <p:pic>
+                    <p:nvPicPr>
+                      <p:cNvPr id="0" name="Αντικείμενο 6"/>
+                      <p:cNvPicPr>
+                        <a:picLocks noChangeAspect="1" noChangeArrowheads="1"/>
+                      </p:cNvPicPr>
+                      <p:nvPr/>
+                    </p:nvPicPr>
+                    <p:blipFill>
+                      <a:blip r:embed="rId8"/>
+                      <a:srcRect/>
+                      <a:stretch>
+                        <a:fillRect/>
+                      </a:stretch>
+                    </p:blipFill>
+                    <p:spPr bwMode="auto">
+                      <a:xfrm>
+                        <a:off x="1487512" y="3426336"/>
+                        <a:ext cx="282575" cy="315913"/>
+                      </a:xfrm>
+                      <a:prstGeom prst="rect">
+                        <a:avLst/>
+                      </a:prstGeom>
+                      <a:noFill/>
+                      <a:ln>
+                        <a:noFill/>
+                      </a:ln>
+                      <a:extLst>
+                        <a:ext uri="{909E8E84-426E-40DD-AFC4-6F175D3DCCD1}">
+                          <a14:hiddenFill xmlns:a14="http://schemas.microsoft.com/office/drawing/2010/main">
+                            <a:solidFill>
+                              <a:srgbClr val="FFFFFF"/>
+                            </a:solidFill>
+                          </a14:hiddenFill>
+                        </a:ext>
+                        <a:ext uri="{91240B29-F687-4F45-9708-019B960494DF}">
+                          <a14:hiddenLine xmlns:a14="http://schemas.microsoft.com/office/drawing/2010/main" w="9525">
+                            <a:solidFill>
+                              <a:srgbClr val="000000"/>
+                            </a:solidFill>
+                            <a:miter lim="800000"/>
+                            <a:headEnd/>
+                            <a:tailEnd/>
+                          </a14:hiddenLine>
+                        </a:ext>
+                      </a:extLst>
+                    </p:spPr>
+                  </p:pic>
+                </p:oleObj>
+              </mc:Fallback>
+            </mc:AlternateContent>
+          </a:graphicData>
+        </a:graphic>
+      </p:graphicFrame>
+      <p:graphicFrame>
+        <p:nvGraphicFramePr>
+          <p:cNvPr id="9" name="Αντικείμενο 8"/>
+          <p:cNvGraphicFramePr>
+            <a:graphicFrameLocks noChangeAspect="1"/>
+          </p:cNvGraphicFramePr>
+          <p:nvPr>
+            <p:extLst>
+              <p:ext uri="{D42A27DB-BD31-4B8C-83A1-F6EECF244321}">
+                <p14:modId xmlns:p14="http://schemas.microsoft.com/office/powerpoint/2010/main" val="3571194871"/>
+              </p:ext>
+            </p:extLst>
+          </p:nvPr>
+        </p:nvGraphicFramePr>
+        <p:xfrm>
+          <a:off x="2314352" y="3426649"/>
+          <a:ext cx="257175" cy="315912"/>
+        </p:xfrm>
+        <a:graphic>
+          <a:graphicData uri="http://schemas.openxmlformats.org/presentationml/2006/ole">
+            <mc:AlternateContent xmlns:mc="http://schemas.openxmlformats.org/markup-compatibility/2006">
+              <mc:Choice xmlns:v="urn:schemas-microsoft-com:vml" Requires="v">
+                <p:oleObj spid="_x0000_s4167" name="Equation" r:id="rId9" imgW="126720" imgH="152280" progId="Equation.DSMT4">
+                  <p:embed/>
+                </p:oleObj>
+              </mc:Choice>
+              <mc:Fallback>
+                <p:oleObj name="Equation" r:id="rId9" imgW="126720" imgH="152280" progId="Equation.DSMT4">
+                  <p:embed/>
+                  <p:pic>
+                    <p:nvPicPr>
+                      <p:cNvPr id="0" name="Αντικείμενο 7"/>
+                      <p:cNvPicPr>
+                        <a:picLocks noChangeAspect="1" noChangeArrowheads="1"/>
+                      </p:cNvPicPr>
+                      <p:nvPr/>
+                    </p:nvPicPr>
+                    <p:blipFill>
+                      <a:blip r:embed="rId10"/>
+                      <a:srcRect/>
+                      <a:stretch>
+                        <a:fillRect/>
+                      </a:stretch>
+                    </p:blipFill>
+                    <p:spPr bwMode="auto">
+                      <a:xfrm>
+                        <a:off x="2314352" y="3426649"/>
+                        <a:ext cx="257175" cy="315912"/>
+                      </a:xfrm>
+                      <a:prstGeom prst="rect">
+                        <a:avLst/>
+                      </a:prstGeom>
+                      <a:noFill/>
+                      <a:ln>
+                        <a:noFill/>
+                      </a:ln>
+                      <a:extLst>
+                        <a:ext uri="{909E8E84-426E-40DD-AFC4-6F175D3DCCD1}">
+                          <a14:hiddenFill xmlns:a14="http://schemas.microsoft.com/office/drawing/2010/main">
+                            <a:solidFill>
+                              <a:srgbClr val="FFFFFF"/>
+                            </a:solidFill>
+                          </a14:hiddenFill>
+                        </a:ext>
+                        <a:ext uri="{91240B29-F687-4F45-9708-019B960494DF}">
+                          <a14:hiddenLine xmlns:a14="http://schemas.microsoft.com/office/drawing/2010/main" w="9525">
+                            <a:solidFill>
+                              <a:srgbClr val="000000"/>
+                            </a:solidFill>
+                            <a:miter lim="800000"/>
+                            <a:headEnd/>
+                            <a:tailEnd/>
+                          </a14:hiddenLine>
+                        </a:ext>
+                      </a:extLst>
+                    </p:spPr>
+                  </p:pic>
+                </p:oleObj>
+              </mc:Fallback>
+            </mc:AlternateContent>
+          </a:graphicData>
+        </a:graphic>
+      </p:graphicFrame>
+      <p:graphicFrame>
+        <p:nvGraphicFramePr>
+          <p:cNvPr id="10" name="Αντικείμενο 9"/>
+          <p:cNvGraphicFramePr>
+            <a:graphicFrameLocks noChangeAspect="1"/>
+          </p:cNvGraphicFramePr>
+          <p:nvPr>
+            <p:extLst>
+              <p:ext uri="{D42A27DB-BD31-4B8C-83A1-F6EECF244321}">
+                <p14:modId xmlns:p14="http://schemas.microsoft.com/office/powerpoint/2010/main" val="1950299976"/>
+              </p:ext>
+            </p:extLst>
+          </p:nvPr>
+        </p:nvGraphicFramePr>
+        <p:xfrm>
+          <a:off x="4512692" y="3356868"/>
+          <a:ext cx="1131888" cy="525462"/>
+        </p:xfrm>
+        <a:graphic>
+          <a:graphicData uri="http://schemas.openxmlformats.org/presentationml/2006/ole">
+            <mc:AlternateContent xmlns:mc="http://schemas.openxmlformats.org/markup-compatibility/2006">
+              <mc:Choice xmlns:v="urn:schemas-microsoft-com:vml" Requires="v">
+                <p:oleObj spid="_x0000_s4168" name="Equation" r:id="rId11" imgW="558720" imgH="253800" progId="Equation.DSMT4">
+                  <p:embed/>
+                </p:oleObj>
+              </mc:Choice>
+              <mc:Fallback>
+                <p:oleObj name="Equation" r:id="rId11" imgW="558720" imgH="253800" progId="Equation.DSMT4">
+                  <p:embed/>
+                  <p:pic>
+                    <p:nvPicPr>
+                      <p:cNvPr id="0" name="Αντικείμενο 8"/>
+                      <p:cNvPicPr>
+                        <a:picLocks noChangeAspect="1" noChangeArrowheads="1"/>
+                      </p:cNvPicPr>
+                      <p:nvPr/>
+                    </p:nvPicPr>
+                    <p:blipFill>
+                      <a:blip r:embed="rId12"/>
+                      <a:srcRect/>
+                      <a:stretch>
+                        <a:fillRect/>
+                      </a:stretch>
+                    </p:blipFill>
+                    <p:spPr bwMode="auto">
+                      <a:xfrm>
+                        <a:off x="4512692" y="3356868"/>
+                        <a:ext cx="1131888" cy="525462"/>
+                      </a:xfrm>
+                      <a:prstGeom prst="rect">
+                        <a:avLst/>
+                      </a:prstGeom>
+                      <a:noFill/>
+                      <a:ln>
+                        <a:noFill/>
+                      </a:ln>
+                      <a:extLst>
+                        <a:ext uri="{909E8E84-426E-40DD-AFC4-6F175D3DCCD1}">
+                          <a14:hiddenFill xmlns:a14="http://schemas.microsoft.com/office/drawing/2010/main">
+                            <a:solidFill>
+                              <a:srgbClr val="FFFFFF"/>
+                            </a:solidFill>
+                          </a14:hiddenFill>
+                        </a:ext>
+                        <a:ext uri="{91240B29-F687-4F45-9708-019B960494DF}">
+                          <a14:hiddenLine xmlns:a14="http://schemas.microsoft.com/office/drawing/2010/main" w="9525">
+                            <a:solidFill>
+                              <a:srgbClr val="000000"/>
+                            </a:solidFill>
+                            <a:miter lim="800000"/>
+                            <a:headEnd/>
+                            <a:tailEnd/>
+                          </a14:hiddenLine>
+                        </a:ext>
+                      </a:extLst>
+                    </p:spPr>
+                  </p:pic>
+                </p:oleObj>
+              </mc:Fallback>
+            </mc:AlternateContent>
+          </a:graphicData>
+        </a:graphic>
+      </p:graphicFrame>
+      <p:graphicFrame>
+        <p:nvGraphicFramePr>
+          <p:cNvPr id="11" name="Αντικείμενο 10"/>
+          <p:cNvGraphicFramePr>
+            <a:graphicFrameLocks noChangeAspect="1"/>
+          </p:cNvGraphicFramePr>
+          <p:nvPr>
+            <p:extLst>
+              <p:ext uri="{D42A27DB-BD31-4B8C-83A1-F6EECF244321}">
+                <p14:modId xmlns:p14="http://schemas.microsoft.com/office/powerpoint/2010/main" val="1305786319"/>
+              </p:ext>
+            </p:extLst>
+          </p:nvPr>
+        </p:nvGraphicFramePr>
+        <p:xfrm>
+          <a:off x="683568" y="4808066"/>
+          <a:ext cx="1033462" cy="527050"/>
+        </p:xfrm>
+        <a:graphic>
+          <a:graphicData uri="http://schemas.openxmlformats.org/presentationml/2006/ole">
+            <mc:AlternateContent xmlns:mc="http://schemas.openxmlformats.org/markup-compatibility/2006">
+              <mc:Choice xmlns:v="urn:schemas-microsoft-com:vml" Requires="v">
+                <p:oleObj spid="_x0000_s4169" name="Equation" r:id="rId13" imgW="507960" imgH="253800" progId="Equation.DSMT4">
+                  <p:embed/>
+                </p:oleObj>
+              </mc:Choice>
+              <mc:Fallback>
+                <p:oleObj name="Equation" r:id="rId13" imgW="507960" imgH="253800" progId="Equation.DSMT4">
+                  <p:embed/>
+                  <p:pic>
+                    <p:nvPicPr>
+                      <p:cNvPr id="0" name="Αντικείμενο 6"/>
+                      <p:cNvPicPr>
+                        <a:picLocks noChangeAspect="1" noChangeArrowheads="1"/>
+                      </p:cNvPicPr>
+                      <p:nvPr/>
+                    </p:nvPicPr>
+                    <p:blipFill>
+                      <a:blip r:embed="rId14"/>
+                      <a:srcRect/>
+                      <a:stretch>
+                        <a:fillRect/>
+                      </a:stretch>
+                    </p:blipFill>
+                    <p:spPr bwMode="auto">
+                      <a:xfrm>
+                        <a:off x="683568" y="4808066"/>
+                        <a:ext cx="1033462" cy="527050"/>
+                      </a:xfrm>
+                      <a:prstGeom prst="rect">
+                        <a:avLst/>
+                      </a:prstGeom>
+                      <a:noFill/>
+                      <a:ln>
+                        <a:noFill/>
+                      </a:ln>
+                      <a:extLst>
+                        <a:ext uri="{909E8E84-426E-40DD-AFC4-6F175D3DCCD1}">
+                          <a14:hiddenFill xmlns:a14="http://schemas.microsoft.com/office/drawing/2010/main">
+                            <a:solidFill>
+                              <a:srgbClr val="FFFFFF"/>
+                            </a:solidFill>
+                          </a14:hiddenFill>
+                        </a:ext>
+                        <a:ext uri="{91240B29-F687-4F45-9708-019B960494DF}">
+                          <a14:hiddenLine xmlns:a14="http://schemas.microsoft.com/office/drawing/2010/main" w="9525">
+                            <a:solidFill>
+                              <a:srgbClr val="000000"/>
+                            </a:solidFill>
+                            <a:miter lim="800000"/>
+                            <a:headEnd/>
+                            <a:tailEnd/>
+                          </a14:hiddenLine>
+                        </a:ext>
+                      </a:extLst>
+                    </p:spPr>
+                  </p:pic>
+                </p:oleObj>
+              </mc:Fallback>
+            </mc:AlternateContent>
+          </a:graphicData>
+        </a:graphic>
+      </p:graphicFrame>
+    </p:spTree>
+    <p:extLst>
+      <p:ext uri="{BB962C8B-B14F-4D97-AF65-F5344CB8AC3E}">
+        <p14:creationId xmlns:p14="http://schemas.microsoft.com/office/powerpoint/2010/main" val="3359835428"/>
+      </p:ext>
+    </p:extLst>
+  </p:cSld>
+  <p:clrMapOvr>
+    <a:masterClrMapping/>
+  </p:clrMapOvr>
+  <p:timing>
+    <p:tnLst>
+      <p:par>
+        <p:cTn id="1" dur="indefinite" restart="never" nodeType="tmRoot"/>
+      </p:par>
+    </p:tnLst>
+  </p:timing>
+</p:sld>
+</file>
+
+<file path=ppt/slides/slide3.xml><?xml version="1.0" encoding="utf-8"?>
 <p:sld xmlns:a="http://schemas.openxmlformats.org/drawingml/2006/main" xmlns:r="http://schemas.openxmlformats.org/officeDocument/2006/relationships" xmlns:p="http://schemas.openxmlformats.org/presentationml/2006/main">
   <p:cSld>
     <p:spTree>
@@ -4059,7 +4738,7 @@
 </p:sld>
 </file>
 
-<file path=ppt/slides/slide3.xml><?xml version="1.0" encoding="utf-8"?>
+<file path=ppt/slides/slide4.xml><?xml version="1.0" encoding="utf-8"?>
 <p:sld xmlns:a="http://schemas.openxmlformats.org/drawingml/2006/main" xmlns:r="http://schemas.openxmlformats.org/officeDocument/2006/relationships" xmlns:p="http://schemas.openxmlformats.org/presentationml/2006/main">
   <p:cSld>
     <p:spTree>
@@ -4156,18 +4835,50 @@
               <a:buNone/>
             </a:pPr>
             <a:r>
-              <a:rPr lang="en-US" dirty="0" smtClean="0"/>
-              <a:t>When the weather is Hot and the day is Vacation, the traffic is High (</a:t>
-            </a:r>
-            <a:r>
-              <a:rPr lang="en-US" dirty="0" err="1" smtClean="0"/>
+              <a:rPr lang="en-US" sz="1600" dirty="0" smtClean="0"/>
+              <a:t>When </a:t>
+            </a:r>
+            <a:r>
+              <a:rPr lang="en-US" sz="1600" dirty="0" smtClean="0"/>
+              <a:t>weather is </a:t>
+            </a:r>
+            <a:r>
+              <a:rPr lang="en-US" sz="1600" dirty="0" smtClean="0"/>
+              <a:t>Hot and </a:t>
+            </a:r>
+            <a:r>
+              <a:rPr lang="en-US" sz="1600" dirty="0" smtClean="0"/>
+              <a:t>day </a:t>
+            </a:r>
+            <a:r>
+              <a:rPr lang="en-US" sz="1600" dirty="0" smtClean="0"/>
+              <a:t>is Vacation, </a:t>
+            </a:r>
+            <a:r>
+              <a:rPr lang="en-US" sz="1600" dirty="0" smtClean="0"/>
+              <a:t>traffic </a:t>
+            </a:r>
+            <a:r>
+              <a:rPr lang="en-US" sz="1600" dirty="0" smtClean="0"/>
+              <a:t>is High (</a:t>
+            </a:r>
+            <a:r>
+              <a:rPr lang="en-US" sz="1600" dirty="0" err="1" smtClean="0"/>
               <a:t>prob</a:t>
             </a:r>
             <a:r>
-              <a:rPr lang="en-US" dirty="0" smtClean="0"/>
-              <a:t>: 0.56)</a:t>
-            </a:r>
-            <a:endParaRPr lang="el-GR" dirty="0"/>
+              <a:rPr lang="en-US" sz="1600" dirty="0" smtClean="0"/>
+              <a:t>: </a:t>
+            </a:r>
+            <a:r>
+              <a:rPr lang="en-US" sz="1600" dirty="0" smtClean="0"/>
+              <a:t>0.65/(0.65+0.51) = 0.56</a:t>
+            </a:r>
+            <a:r>
+              <a:rPr lang="en-US" sz="1600" dirty="0" smtClean="0"/>
+              <a:t>)</a:t>
+            </a:r>
+            <a:endParaRPr lang="el-GR" sz="1600" dirty="0"/>
           </a:p>
         </p:txBody>
       </p:sp>
@@ -4906,7 +5617,7 @@
           <a:graphicData uri="http://schemas.openxmlformats.org/presentationml/2006/ole">
             <mc:AlternateContent xmlns:mc="http://schemas.openxmlformats.org/markup-compatibility/2006">
               <mc:Choice xmlns:v="urn:schemas-microsoft-com:vml" Requires="v">
-                <p:oleObj spid="_x0000_s1077" name="Equation" r:id="rId4" imgW="5905440" imgH="419040" progId="Equation.DSMT4">
+                <p:oleObj spid="_x0000_s1104" name="Equation" r:id="rId4" imgW="5905440" imgH="419040" progId="Equation.DSMT4">
                   <p:embed/>
                 </p:oleObj>
               </mc:Choice>
@@ -5031,7 +5742,7 @@
           <a:graphicData uri="http://schemas.openxmlformats.org/presentationml/2006/ole">
             <mc:AlternateContent xmlns:mc="http://schemas.openxmlformats.org/markup-compatibility/2006">
               <mc:Choice xmlns:v="urn:schemas-microsoft-com:vml" Requires="v">
-                <p:oleObj spid="_x0000_s1078" name="Equation" r:id="rId6" imgW="5765760" imgH="419040" progId="Equation.DSMT4">
+                <p:oleObj spid="_x0000_s1105" name="Equation" r:id="rId6" imgW="5765760" imgH="419040" progId="Equation.DSMT4">
                   <p:embed/>
                 </p:oleObj>
               </mc:Choice>
@@ -5138,7 +5849,7 @@
 </p:sld>
 </file>
 
-<file path=ppt/slides/slide4.xml><?xml version="1.0" encoding="utf-8"?>
+<file path=ppt/slides/slide5.xml><?xml version="1.0" encoding="utf-8"?>
 <p:sld xmlns:a="http://schemas.openxmlformats.org/drawingml/2006/main" xmlns:r="http://schemas.openxmlformats.org/officeDocument/2006/relationships" xmlns:p="http://schemas.openxmlformats.org/presentationml/2006/main">
   <p:cSld>
     <p:spTree>
@@ -5740,7 +6451,7 @@
         <p:spPr>
           <a:xfrm>
             <a:off x="3192104" y="2164458"/>
-            <a:ext cx="1091864" cy="769441"/>
+            <a:ext cx="1091864" cy="707886"/>
           </a:xfrm>
           <a:prstGeom prst="rect">
             <a:avLst/>
@@ -5755,17 +6466,17 @@
           <a:p>
             <a:pPr algn="ctr"/>
             <a:r>
-              <a:rPr lang="en-GB" sz="2200" dirty="0" smtClean="0"/>
+              <a:rPr lang="en-GB" sz="2000" dirty="0" smtClean="0"/>
               <a:t>Actual</a:t>
             </a:r>
           </a:p>
           <a:p>
             <a:pPr algn="ctr"/>
             <a:r>
-              <a:rPr lang="en-GB" sz="2200" dirty="0" smtClean="0"/>
+              <a:rPr lang="en-GB" sz="2000" dirty="0" smtClean="0"/>
               <a:t>Class</a:t>
             </a:r>
-            <a:endParaRPr lang="el-GR" sz="2200" dirty="0"/>
+            <a:endParaRPr lang="el-GR" sz="2000" dirty="0"/>
           </a:p>
         </p:txBody>
       </p:sp>
@@ -5858,7 +6569,7 @@
 </p:sld>
 </file>
 
-<file path=ppt/slides/slide5.xml><?xml version="1.0" encoding="utf-8"?>
+<file path=ppt/slides/slide6.xml><?xml version="1.0" encoding="utf-8"?>
 <p:sld xmlns:a="http://schemas.openxmlformats.org/drawingml/2006/main" xmlns:r="http://schemas.openxmlformats.org/officeDocument/2006/relationships" xmlns:p="http://schemas.openxmlformats.org/presentationml/2006/main">
   <p:cSld>
     <p:spTree>
@@ -5984,7 +6695,7 @@
           <a:graphicData uri="http://schemas.openxmlformats.org/presentationml/2006/ole">
             <mc:AlternateContent xmlns:mc="http://schemas.openxmlformats.org/markup-compatibility/2006">
               <mc:Choice xmlns:v="urn:schemas-microsoft-com:vml" Requires="v">
-                <p:oleObj spid="_x0000_s3085" name="Equation" r:id="rId3" imgW="1206360" imgH="393480" progId="Equation.DSMT4">
+                <p:oleObj spid="_x0000_s3111" name="Equation" r:id="rId3" imgW="1206360" imgH="393480" progId="Equation.DSMT4">
                   <p:embed/>
                 </p:oleObj>
               </mc:Choice>
@@ -6066,6 +6777,15 @@
               </a:clrTo>
             </a:clrChange>
             <a:extLst>
+              <a:ext uri="{BEBA8EAE-BF5A-486C-A8C5-ECC9F3942E4B}">
+                <a14:imgProps xmlns:a14="http://schemas.microsoft.com/office/drawing/2010/main">
+                  <a14:imgLayer r:embed="rId6">
+                    <a14:imgEffect>
+                      <a14:sharpenSoften amount="25000"/>
+                    </a14:imgEffect>
+                  </a14:imgLayer>
+                </a14:imgProps>
+              </a:ext>
               <a:ext uri="{28A0092B-C50C-407E-A947-70E740481C1C}">
                 <a14:useLocalDpi xmlns:a14="http://schemas.microsoft.com/office/drawing/2010/main" val="0"/>
               </a:ext>
@@ -6139,12 +6859,12 @@
           <a:graphicData uri="http://schemas.openxmlformats.org/presentationml/2006/ole">
             <mc:AlternateContent xmlns:mc="http://schemas.openxmlformats.org/markup-compatibility/2006">
               <mc:Choice xmlns:v="urn:schemas-microsoft-com:vml" Requires="v">
-                <p:oleObj spid="_x0000_s3086" name="Equation" r:id="rId6" imgW="1041120" imgH="393480" progId="Equation.DSMT4">
+                <p:oleObj spid="_x0000_s3112" name="Equation" r:id="rId7" imgW="1041120" imgH="393480" progId="Equation.DSMT4">
                   <p:embed/>
                 </p:oleObj>
               </mc:Choice>
               <mc:Fallback>
-                <p:oleObj name="Equation" r:id="rId6" imgW="1041120" imgH="393480" progId="Equation.DSMT4">
+                <p:oleObj name="Equation" r:id="rId7" imgW="1041120" imgH="393480" progId="Equation.DSMT4">
                   <p:embed/>
                   <p:pic>
                     <p:nvPicPr>
@@ -6155,7 +6875,7 @@
                       <p:nvPr/>
                     </p:nvPicPr>
                     <p:blipFill>
-                      <a:blip r:embed="rId7"/>
+                      <a:blip r:embed="rId8"/>
                       <a:srcRect/>
                       <a:stretch>
                         <a:fillRect/>
@@ -6220,7 +6940,7 @@
 </p:sld>
 </file>
 
-<file path=ppt/slides/slide6.xml><?xml version="1.0" encoding="utf-8"?>
+<file path=ppt/slides/slide7.xml><?xml version="1.0" encoding="utf-8"?>
 <p:sld xmlns:a="http://schemas.openxmlformats.org/drawingml/2006/main" xmlns:r="http://schemas.openxmlformats.org/officeDocument/2006/relationships" xmlns:p="http://schemas.openxmlformats.org/presentationml/2006/main">
   <p:cSld>
     <p:spTree>
@@ -6441,7 +7161,7 @@
           <a:graphicData uri="http://schemas.openxmlformats.org/presentationml/2006/ole">
             <mc:AlternateContent xmlns:mc="http://schemas.openxmlformats.org/markup-compatibility/2006">
               <mc:Choice xmlns:v="urn:schemas-microsoft-com:vml" Requires="v">
-                <p:oleObj spid="_x0000_s2069" name="Equation" r:id="rId4" imgW="901440" imgH="393480" progId="Equation.DSMT4">
+                <p:oleObj spid="_x0000_s2095" name="Equation" r:id="rId4" imgW="901440" imgH="393480" progId="Equation.DSMT4">
                   <p:embed/>
                 </p:oleObj>
               </mc:Choice>
@@ -6524,7 +7244,7 @@
           <a:graphicData uri="http://schemas.openxmlformats.org/presentationml/2006/ole">
             <mc:AlternateContent xmlns:mc="http://schemas.openxmlformats.org/markup-compatibility/2006">
               <mc:Choice xmlns:v="urn:schemas-microsoft-com:vml" Requires="v">
-                <p:oleObj spid="_x0000_s2070" name="Equation" r:id="rId6" imgW="901440" imgH="393480" progId="Equation.DSMT4">
+                <p:oleObj spid="_x0000_s2096" name="Equation" r:id="rId6" imgW="901440" imgH="393480" progId="Equation.DSMT4">
                   <p:embed/>
                 </p:oleObj>
               </mc:Choice>

</xml_diff>